<commit_message>
adding images to ppt
</commit_message>
<xml_diff>
--- a/AutoPPT-main/AutoPPT-main/something.pptx
+++ b/AutoPPT-main/AutoPPT-main/something.pptx
@@ -31,6 +31,7 @@
     <p:sldId id="279" r:id="rId30"/>
     <p:sldId id="280" r:id="rId31"/>
     <p:sldId id="281" r:id="rId32"/>
+    <p:sldId id="282" r:id="rId33"/>
   </p:sldIdLst>
   <p:sldSz cx="9144000" cy="6858000" type="screen4x3"/>
   <p:notesSz cx="6858000" cy="9144000"/>
@@ -3120,41 +3121,81 @@
             <a:spLocks noGrp="1"/>
           </p:cNvSpPr>
           <p:nvPr>
-            <p:ph type="ctrTitle"/>
-          </p:nvPr>
-        </p:nvSpPr>
-        <p:spPr/>
-        <p:txBody>
-          <a:bodyPr/>
-          <a:lstStyle/>
-          <a:p>
-            <a:r>
-              <a:t>Main Page</a:t>
-            </a:r>
-          </a:p>
-        </p:txBody>
-      </p:sp>
-      <p:sp>
-        <p:nvSpPr>
-          <p:cNvPr id="3" name="Subtitle 2"/>
-          <p:cNvSpPr>
-            <a:spLocks noGrp="1"/>
-          </p:cNvSpPr>
-          <p:nvPr>
-            <p:ph type="subTitle" idx="1"/>
-          </p:nvPr>
-        </p:nvSpPr>
-        <p:spPr/>
-        <p:txBody>
-          <a:bodyPr/>
-          <a:lstStyle/>
-          <a:p>
-            <a:r>
-              <a:t> by </a:t>
-            </a:r>
-          </a:p>
-        </p:txBody>
-      </p:sp>
+            <p:ph type="title"/>
+          </p:nvPr>
+        </p:nvSpPr>
+        <p:spPr/>
+        <p:txBody>
+          <a:bodyPr/>
+          <a:lstStyle/>
+          <a:p/>
+        </p:txBody>
+      </p:sp>
+      <p:sp>
+        <p:nvSpPr>
+          <p:cNvPr id="3" name="Content Placeholder 2"/>
+          <p:cNvSpPr>
+            <a:spLocks noGrp="1"/>
+          </p:cNvSpPr>
+          <p:nvPr>
+            <p:ph idx="1"/>
+          </p:nvPr>
+        </p:nvSpPr>
+        <p:spPr/>
+        <p:txBody>
+          <a:bodyPr/>
+          <a:lstStyle/>
+          <a:p/>
+        </p:txBody>
+      </p:sp>
+      <p:pic>
+        <p:nvPicPr>
+          <p:cNvPr id="4" name="Picture 3" descr="1.jpg"/>
+          <p:cNvPicPr>
+            <a:picLocks noChangeAspect="1"/>
+          </p:cNvPicPr>
+          <p:nvPr/>
+        </p:nvPicPr>
+        <p:blipFill>
+          <a:blip r:embed="rId2"/>
+          <a:stretch>
+            <a:fillRect/>
+          </a:stretch>
+        </p:blipFill>
+        <p:spPr>
+          <a:xfrm>
+            <a:off x="0" y="0"/>
+            <a:ext cx="8562975" cy="12192000"/>
+          </a:xfrm>
+          <a:prstGeom prst="rect">
+            <a:avLst/>
+          </a:prstGeom>
+        </p:spPr>
+      </p:pic>
+      <p:pic>
+        <p:nvPicPr>
+          <p:cNvPr id="5" name="Picture 4" descr="1.jpg"/>
+          <p:cNvPicPr>
+            <a:picLocks noChangeAspect="1"/>
+          </p:cNvPicPr>
+          <p:nvPr/>
+        </p:nvPicPr>
+        <p:blipFill>
+          <a:blip r:embed="rId2"/>
+          <a:stretch>
+            <a:fillRect/>
+          </a:stretch>
+        </p:blipFill>
+        <p:spPr>
+          <a:xfrm>
+            <a:off x="0" y="914400"/>
+            <a:ext cx="0" cy="0"/>
+          </a:xfrm>
+          <a:prstGeom prst="rect">
+            <a:avLst/>
+          </a:prstGeom>
+        </p:spPr>
+      </p:pic>
     </p:spTree>
   </p:cSld>
   <p:clrMapOvr>
@@ -3189,7 +3230,7 @@
           <a:lstStyle/>
           <a:p>
             <a:r>
-              <a:t>Today's featured picture</a:t>
+              <a:t>Web development usage[edit]</a:t>
             </a:r>
           </a:p>
         </p:txBody>
@@ -3210,7 +3251,7 @@
           <a:lstStyle/>
           <a:p>
             <a:r>
-              <a:t>Today's featured picturep The Japanese government-issued rupee in Burma was Japanese invasion money issued as a replacement for the local currency during the Japanese occupation of Burma in the Second World War.</a:t>
+              <a:t>Web development usage[edit]p In the web development field, three-tier is often used to refer to websites, commonly electronic commerce websites, which are built using three tiers:h3 Other considerations[edit]p Data transfer between tiers is part of the architecture.</a:t>
             </a:r>
           </a:p>
         </p:txBody>
@@ -3249,7 +3290,7 @@
           <a:lstStyle/>
           <a:p>
             <a:r>
-              <a:t>Other areas of Wikipedia</a:t>
+              <a:t>Other considerations[edit]</a:t>
             </a:r>
           </a:p>
         </p:txBody>
@@ -3270,7 +3311,7 @@
           <a:lstStyle/>
           <a:p>
             <a:r>
-              <a:t>Other areas of Wikipediah2 Wikipedia's sister projectsp Wikipedia is hosted by the Wikimedia Foundation, a non-profit organization that also hosts a range of other projects:h2 Wikipedia languagesp This Wikipedia is written in English.</a:t>
+              <a:t>Other considerations[edit]p Data transfer between tiers is part of the architecture.</a:t>
             </a:r>
           </a:p>
         </p:txBody>
@@ -3309,7 +3350,7 @@
           <a:lstStyle/>
           <a:p>
             <a:r>
-              <a:t>Wikipedia's sister projects</a:t>
+              <a:t>Traceability[edit]</a:t>
             </a:r>
           </a:p>
         </p:txBody>
@@ -3330,7 +3371,7 @@
           <a:lstStyle/>
           <a:p>
             <a:r>
-              <a:t>Wikipedia's sister projectsp Wikipedia is hosted by the Wikimedia Foundation, a non-profit organization that also hosts a range of other projects:h2 Wikipedia languagesp This Wikipedia is written in English.</a:t>
+              <a:t>Traceability[edit]p The end-to-end traceability of data flows through n-tier systems is a challenging task which becomes more important when systems increase in complexity.</a:t>
             </a:r>
           </a:p>
         </p:txBody>
@@ -3369,7 +3410,7 @@
           <a:lstStyle/>
           <a:p>
             <a:r>
-              <a:t>Wikipedia languages</a:t>
+              <a:t>See also[edit]</a:t>
             </a:r>
           </a:p>
         </p:txBody>
@@ -3388,11 +3429,7 @@
         <p:txBody>
           <a:bodyPr/>
           <a:lstStyle/>
-          <a:p>
-            <a:r>
-              <a:t>Wikipedia languagesp This Wikipedia is written in English.</a:t>
-            </a:r>
-          </a:p>
+          <a:p/>
         </p:txBody>
       </p:sp>
     </p:spTree>
@@ -3429,7 +3466,7 @@
           <a:lstStyle/>
           <a:p>
             <a:r>
-              <a:t>Navigation menu</a:t>
+              <a:t>References[edit]</a:t>
             </a:r>
           </a:p>
         </p:txBody>
@@ -3485,7 +3522,7 @@
           <a:lstStyle/>
           <a:p>
             <a:r>
-              <a:t>Personal tools</a:t>
+              <a:t>External links[edit]</a:t>
             </a:r>
           </a:p>
         </p:txBody>
@@ -3541,7 +3578,7 @@
           <a:lstStyle/>
           <a:p>
             <a:r>
-              <a:t>Namespaces</a:t>
+              <a:t>Navigation menu</a:t>
             </a:r>
           </a:p>
         </p:txBody>
@@ -3597,7 +3634,7 @@
           <a:lstStyle/>
           <a:p>
             <a:r>
-              <a:t>Variants</a:t>
+              <a:t>Personal tools</a:t>
             </a:r>
           </a:p>
         </p:txBody>
@@ -3653,7 +3690,7 @@
           <a:lstStyle/>
           <a:p>
             <a:r>
-              <a:t>Views</a:t>
+              <a:t>Namespaces</a:t>
             </a:r>
           </a:p>
         </p:txBody>
@@ -3709,7 +3746,7 @@
           <a:lstStyle/>
           <a:p>
             <a:r>
-              <a:t>More</a:t>
+              <a:t>Variants</a:t>
             </a:r>
           </a:p>
         </p:txBody>
@@ -3756,80 +3793,39 @@
             <a:spLocks noGrp="1"/>
           </p:cNvSpPr>
           <p:nvPr>
-            <p:ph type="title"/>
-          </p:nvPr>
-        </p:nvSpPr>
-        <p:spPr/>
-        <p:txBody>
-          <a:bodyPr/>
-          <a:lstStyle/>
-          <a:p>
-            <a:r>
-              <a:t>contents</a:t>
-            </a:r>
-          </a:p>
-        </p:txBody>
-      </p:sp>
-      <p:sp>
-        <p:nvSpPr>
-          <p:cNvPr id="3" name="Content Placeholder 2"/>
-          <p:cNvSpPr>
-            <a:spLocks noGrp="1"/>
-          </p:cNvSpPr>
-          <p:nvPr>
-            <p:ph idx="1"/>
-          </p:nvPr>
-        </p:nvSpPr>
-        <p:spPr/>
-        <p:txBody>
-          <a:bodyPr/>
-          <a:lstStyle/>
-          <a:p>
-            <a:r>
-              <a:t> From today's featured article</a:t>
-            </a:r>
-          </a:p>
-          <a:p>
-            <a:r>
-              <a:t> Did you know ...</a:t>
-            </a:r>
-          </a:p>
-          <a:p>
-            <a:r>
-              <a:t> In the news</a:t>
-            </a:r>
-          </a:p>
-          <a:p>
-            <a:r>
-              <a:t> On this day</a:t>
-            </a:r>
-          </a:p>
-          <a:p>
-            <a:r>
-              <a:t> From today's featured list</a:t>
-            </a:r>
-          </a:p>
-          <a:p>
-            <a:r>
-              <a:t> Today's featured picture</a:t>
-            </a:r>
-          </a:p>
-          <a:p>
-            <a:r>
-              <a:t> Other areas of Wikipedia</a:t>
-            </a:r>
-          </a:p>
-          <a:p>
-            <a:r>
-              <a:t> Wikipedia's sister projects</a:t>
-            </a:r>
-          </a:p>
-          <a:p>
-            <a:r>
-              <a:t> Wikipedia languages</a:t>
-            </a:r>
-          </a:p>
-          <a:p/>
+            <p:ph type="ctrTitle"/>
+          </p:nvPr>
+        </p:nvSpPr>
+        <p:spPr/>
+        <p:txBody>
+          <a:bodyPr/>
+          <a:lstStyle/>
+          <a:p>
+            <a:r>
+              <a:t>Multitier architecture</a:t>
+            </a:r>
+          </a:p>
+        </p:txBody>
+      </p:sp>
+      <p:sp>
+        <p:nvSpPr>
+          <p:cNvPr id="3" name="Subtitle 2"/>
+          <p:cNvSpPr>
+            <a:spLocks noGrp="1"/>
+          </p:cNvSpPr>
+          <p:nvPr>
+            <p:ph type="subTitle" idx="1"/>
+          </p:nvPr>
+        </p:nvSpPr>
+        <p:spPr/>
+        <p:txBody>
+          <a:bodyPr/>
+          <a:lstStyle/>
+          <a:p>
+            <a:r>
+              <a:t> by Theamanamanaman@gmail.com</a:t>
+            </a:r>
+          </a:p>
         </p:txBody>
       </p:sp>
     </p:spTree>
@@ -3866,7 +3862,7 @@
           <a:lstStyle/>
           <a:p>
             <a:r>
-              <a:t>Search</a:t>
+              <a:t>Views</a:t>
             </a:r>
           </a:p>
         </p:txBody>
@@ -3922,7 +3918,7 @@
           <a:lstStyle/>
           <a:p>
             <a:r>
-              <a:t>Navigation</a:t>
+              <a:t>More</a:t>
             </a:r>
           </a:p>
         </p:txBody>
@@ -3978,7 +3974,7 @@
           <a:lstStyle/>
           <a:p>
             <a:r>
-              <a:t>Contribute</a:t>
+              <a:t>Search</a:t>
             </a:r>
           </a:p>
         </p:txBody>
@@ -4034,7 +4030,7 @@
           <a:lstStyle/>
           <a:p>
             <a:r>
-              <a:t>Tools</a:t>
+              <a:t>Navigation</a:t>
             </a:r>
           </a:p>
         </p:txBody>
@@ -4090,7 +4086,7 @@
           <a:lstStyle/>
           <a:p>
             <a:r>
-              <a:t>Print/export</a:t>
+              <a:t>Contribute</a:t>
             </a:r>
           </a:p>
         </p:txBody>
@@ -4146,7 +4142,7 @@
           <a:lstStyle/>
           <a:p>
             <a:r>
-              <a:t>In other projects</a:t>
+              <a:t>Tools</a:t>
             </a:r>
           </a:p>
         </p:txBody>
@@ -4202,6 +4198,62 @@
           <a:lstStyle/>
           <a:p>
             <a:r>
+              <a:t>Print/export</a:t>
+            </a:r>
+          </a:p>
+        </p:txBody>
+      </p:sp>
+      <p:sp>
+        <p:nvSpPr>
+          <p:cNvPr id="3" name="Content Placeholder 2"/>
+          <p:cNvSpPr>
+            <a:spLocks noGrp="1"/>
+          </p:cNvSpPr>
+          <p:nvPr>
+            <p:ph idx="1"/>
+          </p:nvPr>
+        </p:nvSpPr>
+        <p:spPr/>
+        <p:txBody>
+          <a:bodyPr/>
+          <a:lstStyle/>
+          <a:p/>
+        </p:txBody>
+      </p:sp>
+    </p:spTree>
+  </p:cSld>
+  <p:clrMapOvr>
+    <a:masterClrMapping/>
+  </p:clrMapOvr>
+</p:sld>
+</file>
+
+<file path=ppt/slides/slide27.xml><?xml version="1.0" encoding="utf-8"?>
+<p:sld xmlns:a="http://schemas.openxmlformats.org/drawingml/2006/main" xmlns:p="http://schemas.openxmlformats.org/presentationml/2006/main" xmlns:r="http://schemas.openxmlformats.org/officeDocument/2006/relationships">
+  <p:cSld>
+    <p:spTree>
+      <p:nvGrpSpPr>
+        <p:cNvPr id="1" name=""/>
+        <p:cNvGrpSpPr/>
+        <p:nvPr/>
+      </p:nvGrpSpPr>
+      <p:grpSpPr/>
+      <p:sp>
+        <p:nvSpPr>
+          <p:cNvPr id="2" name="Title 1"/>
+          <p:cNvSpPr>
+            <a:spLocks noGrp="1"/>
+          </p:cNvSpPr>
+          <p:nvPr>
+            <p:ph type="title"/>
+          </p:nvPr>
+        </p:nvSpPr>
+        <p:spPr/>
+        <p:txBody>
+          <a:bodyPr/>
+          <a:lstStyle/>
+          <a:p>
+            <a:r>
               <a:t>Languages</a:t>
             </a:r>
           </a:p>
@@ -4279,42 +4331,47 @@
           <a:lstStyle/>
           <a:p>
             <a:r>
-              <a:t> Navigation menu</a:t>
-            </a:r>
-          </a:p>
-          <a:p>
-            <a:r>
-              <a:t>  -- Personal tools</a:t>
-            </a:r>
-          </a:p>
-          <a:p>
-            <a:r>
-              <a:t>  -- Namespaces</a:t>
-            </a:r>
-          </a:p>
-          <a:p>
-            <a:r>
-              <a:t>  -- Variants</a:t>
-            </a:r>
-          </a:p>
-          <a:p>
-            <a:r>
-              <a:t>  -- Views</a:t>
-            </a:r>
-          </a:p>
-          <a:p>
-            <a:r>
-              <a:t>  -- More</a:t>
-            </a:r>
-          </a:p>
-          <a:p>
-            <a:r>
-              <a:t>  -- Search</a:t>
-            </a:r>
-          </a:p>
-          <a:p>
-            <a:r>
-              <a:t>  -- Navigation</a:t>
+              <a:t> Contents</a:t>
+            </a:r>
+          </a:p>
+          <a:p>
+            <a:r>
+              <a:t> Layers[edit]</a:t>
+            </a:r>
+          </a:p>
+          <a:p>
+            <a:r>
+              <a:t>  -- Common layers[edit]</a:t>
+            </a:r>
+          </a:p>
+          <a:p>
+            <a:r>
+              <a:t> Three-tier architecture[edit]</a:t>
+            </a:r>
+          </a:p>
+          <a:p>
+            <a:r>
+              <a:t>  -- Web development usage[edit]</a:t>
+            </a:r>
+          </a:p>
+          <a:p>
+            <a:r>
+              <a:t>  -- Other considerations[edit]</a:t>
+            </a:r>
+          </a:p>
+          <a:p>
+            <a:r>
+              <a:t> Traceability[edit]</a:t>
+            </a:r>
+          </a:p>
+          <a:p>
+            <a:r>
+              <a:t> See also[edit]</a:t>
+            </a:r>
+          </a:p>
+          <a:p>
+            <a:r>
+              <a:t> References[edit]</a:t>
             </a:r>
           </a:p>
           <a:p/>
@@ -4375,22 +4432,42 @@
           <a:lstStyle/>
           <a:p>
             <a:r>
-              <a:t>  -- Tools</a:t>
-            </a:r>
-          </a:p>
-          <a:p>
-            <a:r>
-              <a:t>  -- Print/export</a:t>
-            </a:r>
-          </a:p>
-          <a:p>
-            <a:r>
-              <a:t>  -- In other projects</a:t>
-            </a:r>
-          </a:p>
-          <a:p>
-            <a:r>
-              <a:t>  -- Languages</a:t>
+              <a:t> External links[edit]</a:t>
+            </a:r>
+          </a:p>
+          <a:p>
+            <a:r>
+              <a:t> Navigation menu</a:t>
+            </a:r>
+          </a:p>
+          <a:p>
+            <a:r>
+              <a:t>  -- Personal tools</a:t>
+            </a:r>
+          </a:p>
+          <a:p>
+            <a:r>
+              <a:t>  -- Namespaces</a:t>
+            </a:r>
+          </a:p>
+          <a:p>
+            <a:r>
+              <a:t>  -- Variants</a:t>
+            </a:r>
+          </a:p>
+          <a:p>
+            <a:r>
+              <a:t>  -- Views</a:t>
+            </a:r>
+          </a:p>
+          <a:p>
+            <a:r>
+              <a:t>  -- More</a:t>
+            </a:r>
+          </a:p>
+          <a:p>
+            <a:r>
+              <a:t>  -- Search</a:t>
             </a:r>
           </a:p>
           <a:p/>
@@ -4430,7 +4507,7 @@
           <a:lstStyle/>
           <a:p>
             <a:r>
-              <a:t>From today's featured article</a:t>
+              <a:t>contents</a:t>
             </a:r>
           </a:p>
         </p:txBody>
@@ -4451,9 +4528,25 @@
           <a:lstStyle/>
           <a:p>
             <a:r>
-              <a:t>From today's featured articlep Sahure was a pharaoh of ancient Egypt and the second ruler of the Fifth Dynasty, who reigned for about 12 years in the early 25th century BC during the Old Kingdom Period.</a:t>
-            </a:r>
-          </a:p>
+              <a:t>  -- Contribute</a:t>
+            </a:r>
+          </a:p>
+          <a:p>
+            <a:r>
+              <a:t>  -- Tools</a:t>
+            </a:r>
+          </a:p>
+          <a:p>
+            <a:r>
+              <a:t>  -- Print/export</a:t>
+            </a:r>
+          </a:p>
+          <a:p>
+            <a:r>
+              <a:t>  -- Languages</a:t>
+            </a:r>
+          </a:p>
+          <a:p/>
         </p:txBody>
       </p:sp>
     </p:spTree>
@@ -4490,7 +4583,7 @@
           <a:lstStyle/>
           <a:p>
             <a:r>
-              <a:t>Did you know ...</a:t>
+              <a:t>Contents</a:t>
             </a:r>
           </a:p>
         </p:txBody>
@@ -4511,7 +4604,7 @@
           <a:lstStyle/>
           <a:p>
             <a:r>
-              <a:t>Did you know .</a:t>
+              <a:t>Contentsh2 Layers[edit]p The "Layers" architectural pattern has been described in various publications.</a:t>
             </a:r>
           </a:p>
         </p:txBody>
@@ -4550,7 +4643,7 @@
           <a:lstStyle/>
           <a:p>
             <a:r>
-              <a:t>In the news</a:t>
+              <a:t>Layers[edit]</a:t>
             </a:r>
           </a:p>
         </p:txBody>
@@ -4571,7 +4664,7 @@
           <a:lstStyle/>
           <a:p>
             <a:r>
-              <a:t>In the newsh2 On this dayp November 20: Transgender Day of Remembrance; National Sovereignty Day in Argentina (1845)h2 From today's featured listp The Archbishop of Quebec is the head of the Roman Catholic Archdiocese of Quebec, responsible for looking after its spiritual and administrative needs.</a:t>
+              <a:t>Layers[edit]p The "Layers" architectural pattern has been described in various publications.</a:t>
             </a:r>
           </a:p>
         </p:txBody>
@@ -4610,7 +4703,7 @@
           <a:lstStyle/>
           <a:p>
             <a:r>
-              <a:t>On this day</a:t>
+              <a:t>Common layers[edit]</a:t>
             </a:r>
           </a:p>
         </p:txBody>
@@ -4631,7 +4724,7 @@
           <a:lstStyle/>
           <a:p>
             <a:r>
-              <a:t>On this dayp November 20: Transgender Day of Remembrance; National Sovereignty Day in Argentina (1845)h2 From today's featured listp The Archbishop of Quebec is the head of the Roman Catholic Archdiocese of Quebec, responsible for looking after its spiritual and administrative needs.</a:t>
+              <a:t>Common layers[edit]p In a logical multilayered architecture for an information system with an object-oriented design, the following four are the most common:p The book Domain Driven Design describes some common uses for the above four layers, although its primary focus is the domain layer.</a:t>
             </a:r>
           </a:p>
         </p:txBody>
@@ -4670,7 +4763,7 @@
           <a:lstStyle/>
           <a:p>
             <a:r>
-              <a:t>From today's featured list</a:t>
+              <a:t>Three-tier architecture[edit]</a:t>
             </a:r>
           </a:p>
         </p:txBody>
@@ -4691,7 +4784,7 @@
           <a:lstStyle/>
           <a:p>
             <a:r>
-              <a:t>From today's featured listp The Archbishop of Quebec is the head of the Roman Catholic Archdiocese of Quebec, responsible for looking after its spiritual and administrative needs.</a:t>
+              <a:t>Three-tier architecture[edit]p Three-tier architecture is a client-server software architecture pattern in which the user interface (presentation), functional process logic ("business rules"), computer data storage and data access are developed and maintained as independent modules, most often on separate platforms.</a:t>
             </a:r>
           </a:p>
         </p:txBody>

</xml_diff>

<commit_message>
download option for the ppt
</commit_message>
<xml_diff>
--- a/AutoPPT-main/AutoPPT-main/something.pptx
+++ b/AutoPPT-main/AutoPPT-main/something.pptx
@@ -44,6 +44,26 @@
     <p:sldId id="292" r:id="rId43"/>
     <p:sldId id="293" r:id="rId44"/>
     <p:sldId id="294" r:id="rId45"/>
+    <p:sldId id="295" r:id="rId46"/>
+    <p:sldId id="296" r:id="rId47"/>
+    <p:sldId id="297" r:id="rId48"/>
+    <p:sldId id="298" r:id="rId49"/>
+    <p:sldId id="299" r:id="rId50"/>
+    <p:sldId id="300" r:id="rId51"/>
+    <p:sldId id="301" r:id="rId52"/>
+    <p:sldId id="302" r:id="rId53"/>
+    <p:sldId id="303" r:id="rId54"/>
+    <p:sldId id="304" r:id="rId55"/>
+    <p:sldId id="305" r:id="rId56"/>
+    <p:sldId id="306" r:id="rId57"/>
+    <p:sldId id="307" r:id="rId58"/>
+    <p:sldId id="308" r:id="rId59"/>
+    <p:sldId id="309" r:id="rId60"/>
+    <p:sldId id="310" r:id="rId61"/>
+    <p:sldId id="311" r:id="rId62"/>
+    <p:sldId id="312" r:id="rId63"/>
+    <p:sldId id="313" r:id="rId64"/>
+    <p:sldId id="314" r:id="rId65"/>
   </p:sldIdLst>
   <p:sldSz cx="9144000" cy="6858000" type="screen4x3"/>
   <p:notesSz cx="6858000" cy="9144000"/>
@@ -3242,7 +3262,7 @@
           <a:lstStyle/>
           <a:p>
             <a:r>
-              <a:t>Formal</a:t>
+              <a:t>Causes[edit]</a:t>
             </a:r>
           </a:p>
         </p:txBody>
@@ -3263,7 +3283,7 @@
           <a:lstStyle/>
           <a:p>
             <a:r>
-              <a:t>Formal education is commonly divided formally into such stages as preschool or kindergarten, primary school, secondary school and then college, university, or apprenticeship.</a:t>
+              <a:t>Causes[edit]p The wind is caused by differences in atmospheric pressure.</a:t>
             </a:r>
           </a:p>
         </p:txBody>
@@ -3302,7 +3322,7 @@
           <a:lstStyle/>
           <a:p>
             <a:r>
-              <a:t>Early childhood</a:t>
+              <a:t>Measurement[edit]</a:t>
             </a:r>
           </a:p>
         </p:txBody>
@@ -3323,7 +3343,7 @@
           <a:lstStyle/>
           <a:p>
             <a:r>
-              <a:t>Early childhoodp Education designed to support early development in preparation for participation in school and society.</a:t>
+              <a:t>Measurement[edit]p Wind direction is usually expressed in terms of the direction from which it originates.</a:t>
             </a:r>
           </a:p>
         </p:txBody>
@@ -3362,7 +3382,7 @@
           <a:lstStyle/>
           <a:p>
             <a:r>
-              <a:t>Primary</a:t>
+              <a:t>Wind force scale[edit]</a:t>
             </a:r>
           </a:p>
         </p:txBody>
@@ -3383,7 +3403,7 @@
           <a:lstStyle/>
           <a:p>
             <a:r>
-              <a:t>Primaryp This is ISCED level 1.</a:t>
+              <a:t>Wind force scale[edit]p Historically, the Beaufort wind force scale (created by Beaufort) provides an empirical description of wind speed based on observed sea conditions.</a:t>
             </a:r>
           </a:p>
         </p:txBody>
@@ -3422,7 +3442,7 @@
           <a:lstStyle/>
           <a:p>
             <a:r>
-              <a:t>Secondary</a:t>
+              <a:t>Enhanced Fujita scale[edit]</a:t>
             </a:r>
           </a:p>
         </p:txBody>
@@ -3443,7 +3463,7 @@
           <a:lstStyle/>
           <a:p>
             <a:r>
-              <a:t>Secondaryp This covers the two ISCED levels, ISCED 2: Lower Secondary Education and ISCED 3: Upper Secondary Education.</a:t>
+              <a:t>Enhanced Fujita scale[edit]p The Enhanced Fujita Scale (EF Scale) rates the strength of tornadoes in the United States by using damage to estimate wind speed.</a:t>
             </a:r>
           </a:p>
         </p:txBody>
@@ -3482,7 +3502,7 @@
           <a:lstStyle/>
           <a:p>
             <a:r>
-              <a:t>Tertiary</a:t>
+              <a:t>Station model[edit]</a:t>
             </a:r>
           </a:p>
         </p:txBody>
@@ -3503,7 +3523,7 @@
           <a:lstStyle/>
           <a:p>
             <a:r>
-              <a:t>Tertiaryp Higher education, also called tertiary, third stage, or postsecondary education, is the non-compulsory educational level that follows the completion of a school such as a high school or secondary school.</a:t>
+              <a:t>Station model[edit]p The station model plotted on surface weather maps uses a wind barb to show both wind direction and speed.</a:t>
             </a:r>
           </a:p>
         </p:txBody>
@@ -3542,7 +3562,7 @@
           <a:lstStyle/>
           <a:p>
             <a:r>
-              <a:t>Vocational</a:t>
+              <a:t>Wind power[edit]</a:t>
             </a:r>
           </a:p>
         </p:txBody>
@@ -3563,7 +3583,7 @@
           <a:lstStyle/>
           <a:p>
             <a:r>
-              <a:t>Vocationalp Vocational education is a form of education focused on direct and practical training for a specific trade or craft.</a:t>
+              <a:t>Wind power[edit]p Wind energy is the kinetic energy of the air in motion.</a:t>
             </a:r>
           </a:p>
         </p:txBody>
@@ -3602,7 +3622,7 @@
           <a:lstStyle/>
           <a:p>
             <a:r>
-              <a:t>Special</a:t>
+              <a:t>Theoretical power captured by a wind turbine[edit]</a:t>
             </a:r>
           </a:p>
         </p:txBody>
@@ -3623,7 +3643,7 @@
           <a:lstStyle/>
           <a:p>
             <a:r>
-              <a:t>Specialp In the past, those who were disabled were often not eligible for public education.</a:t>
+              <a:t>Theoretical power captured by a wind turbine[edit]p Total wind power could be captured only if the wind velocity is reduced to zero.</a:t>
             </a:r>
           </a:p>
         </p:txBody>
@@ -3662,7 +3682,7 @@
           <a:lstStyle/>
           <a:p>
             <a:r>
-              <a:t>Other forms</a:t>
+              <a:t>Practical wind turbine power[edit]</a:t>
             </a:r>
           </a:p>
         </p:txBody>
@@ -3683,7 +3703,7 @@
           <a:lstStyle/>
           <a:p>
             <a:r>
-              <a:t>Other formsh3 Alternativep While considered "alternative" today, most alternative systems have existed since ancient times.</a:t>
+              <a:t>Practical wind turbine power[edit]p Further insufficiencies, such as rotor blade friction and drag, gearbox losses, generator and converter losses, reduce the power delivered by a wind turbine.</a:t>
             </a:r>
           </a:p>
         </p:txBody>
@@ -3722,7 +3742,7 @@
           <a:lstStyle/>
           <a:p>
             <a:r>
-              <a:t>Alternative</a:t>
+              <a:t>Global climatology[edit]</a:t>
             </a:r>
           </a:p>
         </p:txBody>
@@ -3743,7 +3763,7 @@
           <a:lstStyle/>
           <a:p>
             <a:r>
-              <a:t>Alternativep While considered "alternative" today, most alternative systems have existed since ancient times.</a:t>
+              <a:t>Global climatology[edit]p Easterly winds, on average, dominate the flow pattern across the poles, westerly winds blow across the mid-latitudes of the earth, polewards of the subtropical ridge, while easterlies again dominate the tropics.</a:t>
             </a:r>
           </a:p>
         </p:txBody>
@@ -3782,7 +3802,7 @@
           <a:lstStyle/>
           <a:p>
             <a:r>
-              <a:t>Indigenous</a:t>
+              <a:t>Tropics[edit]</a:t>
             </a:r>
           </a:p>
         </p:txBody>
@@ -3803,7 +3823,7 @@
           <a:lstStyle/>
           <a:p>
             <a:r>
-              <a:t>Indigenousp Indigenous education refers to the inclusion of indigenous knowledge, models, methods, and content within formal and non-formal educational systems.</a:t>
+              <a:t>Tropics[edit]p The trade winds (also called trades) are the prevailing pattern of easterly surface winds found in the tropics towards the Earth's equator.</a:t>
             </a:r>
           </a:p>
         </p:txBody>
@@ -3842,7 +3862,7 @@
           <a:lstStyle/>
           <a:p>
             <a:r>
-              <a:t>Education</a:t>
+              <a:t>Wind</a:t>
             </a:r>
           </a:p>
         </p:txBody>
@@ -3863,7 +3883,7 @@
           <a:lstStyle/>
           <a:p>
             <a:r>
-              <a:t> by Akash</a:t>
+              <a:t> by aman</a:t>
             </a:r>
           </a:p>
         </p:txBody>
@@ -3902,7 +3922,7 @@
           <a:lstStyle/>
           <a:p>
             <a:r>
-              <a:t>Informal learning</a:t>
+              <a:t>Westerlies and their impact[edit]</a:t>
             </a:r>
           </a:p>
         </p:txBody>
@@ -3923,7 +3943,7 @@
           <a:lstStyle/>
           <a:p>
             <a:r>
-              <a:t>Informal learningp Informal learning is one of three forms of learning defined by the Organisation for Economic Co-operation and Development (OECD).</a:t>
+              <a:t>Westerlies and their impact[edit]p The Westerlies or the Prevailing Westerlies are the prevailing winds in the middle latitudes between 35 and 65 degrees latitude.</a:t>
             </a:r>
           </a:p>
         </p:txBody>
@@ -3962,7 +3982,7 @@
           <a:lstStyle/>
           <a:p>
             <a:r>
-              <a:t>Self-directed learning</a:t>
+              <a:t>Polar easterlies[edit]</a:t>
             </a:r>
           </a:p>
         </p:txBody>
@@ -3983,7 +4003,7 @@
           <a:lstStyle/>
           <a:p>
             <a:r>
-              <a:t>Self-directed learningp Autodidacticism (also autodidactism) is self-directed learning.</a:t>
+              <a:t>Polar easterlies[edit]p The polar easterlies, also known as Polar Hadley cells, are dry, cold prevailing winds that blow from the high-pressure areas of the polar highs at the north and south poles towards the low-pressure areas within the Westerlies at high latitudes.</a:t>
             </a:r>
           </a:p>
         </p:txBody>
@@ -4022,7 +4042,7 @@
           <a:lstStyle/>
           <a:p>
             <a:r>
-              <a:t>Evidence-based</a:t>
+              <a:t>Local considerations[edit]</a:t>
             </a:r>
           </a:p>
         </p:txBody>
@@ -4043,7 +4063,7 @@
           <a:lstStyle/>
           <a:p>
             <a:r>
-              <a:t>Evidence-basedp Evidence-based education is the use of well designed scientific studies to determine which education methods work best.</a:t>
+              <a:t>Local considerations[edit]h3 Sea and land breezes[edit]p In coastal regions, sea breezes and land breezes can be important factors in a location's prevailing winds.</a:t>
             </a:r>
           </a:p>
         </p:txBody>
@@ -4082,7 +4102,7 @@
           <a:lstStyle/>
           <a:p>
             <a:r>
-              <a:t>Open learning and electronic technology</a:t>
+              <a:t>Sea and land breezes[edit]</a:t>
             </a:r>
           </a:p>
         </p:txBody>
@@ -4103,7 +4123,7 @@
           <a:lstStyle/>
           <a:p>
             <a:r>
-              <a:t>Open learning and electronic technologyp Many large university institutions are now starting to offer free or almost free full courses such as Harvard, MIT and Berkeley teaming up to form edX.</a:t>
+              <a:t>Sea and land breezes[edit]p In coastal regions, sea breezes and land breezes can be important factors in a location's prevailing winds.</a:t>
             </a:r>
           </a:p>
         </p:txBody>
@@ -4142,7 +4162,7 @@
           <a:lstStyle/>
           <a:p>
             <a:r>
-              <a:t>Public schooling</a:t>
+              <a:t>Near mountains[edit]</a:t>
             </a:r>
           </a:p>
         </p:txBody>
@@ -4163,7 +4183,7 @@
           <a:lstStyle/>
           <a:p>
             <a:r>
-              <a:t>Public schoolingp The education sector or education system is a group of institutions (ministries of education, local educational authorities, teacher training institutions, schools, universities, etc.</a:t>
+              <a:t>Near mountains[edit]p Over elevated surfaces, heating of the ground exceeds the heating of the surrounding air at the same altitude above sea level, creating an associated thermal low over the terrain and enhancing any thermal lows that would have otherwise existed,[48][49] and changing the wind circulation of the region.</a:t>
             </a:r>
           </a:p>
         </p:txBody>
@@ -4202,7 +4222,7 @@
           <a:lstStyle/>
           <a:p>
             <a:r>
-              <a:t>Development goals</a:t>
+              <a:t>Average wind speeds[edit]</a:t>
             </a:r>
           </a:p>
         </p:txBody>
@@ -4223,7 +4243,7 @@
           <a:lstStyle/>
           <a:p>
             <a:r>
-              <a:t>Development goalsp Joseph Chimombo pointed out education's role as a policy instrument, capable of instilling social change and economic advancement in developing countries by giving communities the opportunity to take control of their destinies.</a:t>
+              <a:t>Average wind speeds[edit]p As described earlier, prevailing and local winds are not spread evenly across the earth, which means that wind speeds also differ by region.</a:t>
             </a:r>
           </a:p>
         </p:txBody>
@@ -4262,7 +4282,7 @@
           <a:lstStyle/>
           <a:p>
             <a:r>
-              <a:t>Internationalisation</a:t>
+              <a:t>Wind power density[edit]</a:t>
             </a:r>
           </a:p>
         </p:txBody>
@@ -4283,7 +4303,7 @@
           <a:lstStyle/>
           <a:p>
             <a:r>
-              <a:t>Internationalisationp Nearly every country now has universal primary education.</a:t>
+              <a:t>Wind power density[edit]p Nowadays, a yardstick used to determine the best locations for wind energy development is referred to as wind power density (WPD).</a:t>
             </a:r>
           </a:p>
         </p:txBody>
@@ -4322,7 +4342,7 @@
           <a:lstStyle/>
           <a:p>
             <a:r>
-              <a:t>Technology in developing countries</a:t>
+              <a:t>Shear[edit]</a:t>
             </a:r>
           </a:p>
         </p:txBody>
@@ -4343,7 +4363,7 @@
           <a:lstStyle/>
           <a:p>
             <a:r>
-              <a:t>Technology in developing countriesp Technology plays an increasingly significant role in improving access to education for people living in impoverished areas and developing countries.</a:t>
+              <a:t>Shear[edit]p Wind shear, sometimes referred to as wind gradient, is a difference in wind speed and direction over a relatively short distance in the Earth's atmosphere.</a:t>
             </a:r>
           </a:p>
         </p:txBody>
@@ -4382,7 +4402,7 @@
           <a:lstStyle/>
           <a:p>
             <a:r>
-              <a:t>Funding in developing countries</a:t>
+              <a:t>Usage[edit]</a:t>
             </a:r>
           </a:p>
         </p:txBody>
@@ -4403,7 +4423,7 @@
           <a:lstStyle/>
           <a:p>
             <a:r>
-              <a:t>Funding in developing countriesp A survey of literature of the research into low-cost private schools (LCPS) found that over 5-year period to July 2013, debate around LCPSs to achieving Education for All (EFA) objectives was polarized and finding growing coverage in international policy.</a:t>
+              <a:t>Usage[edit]h3 History[edit]p As a natural force, the wind was often personified as one or more wind gods or as an expression of the supernatural in many cultures.</a:t>
             </a:r>
           </a:p>
         </p:txBody>
@@ -4442,7 +4462,7 @@
           <a:lstStyle/>
           <a:p>
             <a:r>
-              <a:t>Theory</a:t>
+              <a:t>History[edit]</a:t>
             </a:r>
           </a:p>
         </p:txBody>
@@ -4463,7 +4483,7 @@
           <a:lstStyle/>
           <a:p>
             <a:r>
-              <a:t>Theoryh3 Psychologyp Educational psychology is the study of how humans learn in educational settings, the effectiveness of educational interventions, the psychology of teaching, and the social psychology of schools as organizations.</a:t>
+              <a:t>History[edit]p As a natural force, the wind was often personified as one or more wind gods or as an expression of the supernatural in many cultures.</a:t>
             </a:r>
           </a:p>
         </p:txBody>
@@ -4528,42 +4548,42 @@
           </a:p>
           <a:p>
             <a:r>
-              <a:t> Etymology</a:t>
-            </a:r>
-          </a:p>
-          <a:p>
-            <a:r>
-              <a:t> History</a:t>
-            </a:r>
-          </a:p>
-          <a:p>
-            <a:r>
-              <a:t> Formal</a:t>
-            </a:r>
-          </a:p>
-          <a:p>
-            <a:r>
-              <a:t>  -- Early childhood</a:t>
-            </a:r>
-          </a:p>
-          <a:p>
-            <a:r>
-              <a:t>  -- Primary</a:t>
-            </a:r>
-          </a:p>
-          <a:p>
-            <a:r>
-              <a:t>  -- Secondary</a:t>
-            </a:r>
-          </a:p>
-          <a:p>
-            <a:r>
-              <a:t>  -- Tertiary</a:t>
-            </a:r>
-          </a:p>
-          <a:p>
-            <a:r>
-              <a:t>  -- Vocational</a:t>
+              <a:t> Causes[edit]</a:t>
+            </a:r>
+          </a:p>
+          <a:p>
+            <a:r>
+              <a:t> Measurement[edit]</a:t>
+            </a:r>
+          </a:p>
+          <a:p>
+            <a:r>
+              <a:t> Wind force scale[edit]</a:t>
+            </a:r>
+          </a:p>
+          <a:p>
+            <a:r>
+              <a:t>  -- Enhanced Fujita scale[edit]</a:t>
+            </a:r>
+          </a:p>
+          <a:p>
+            <a:r>
+              <a:t>  -- Station model[edit]</a:t>
+            </a:r>
+          </a:p>
+          <a:p>
+            <a:r>
+              <a:t> Wind power[edit]</a:t>
+            </a:r>
+          </a:p>
+          <a:p>
+            <a:r>
+              <a:t>  -- Theoretical power captured by a wind turbine[edit]</a:t>
+            </a:r>
+          </a:p>
+          <a:p>
+            <a:r>
+              <a:t>  -- Practical wind turbine power[edit]</a:t>
             </a:r>
           </a:p>
           <a:p/>
@@ -4603,7 +4623,7 @@
           <a:lstStyle/>
           <a:p>
             <a:r>
-              <a:t>Psychology</a:t>
+              <a:t>Transportation[edit]</a:t>
             </a:r>
           </a:p>
         </p:txBody>
@@ -4624,7 +4644,7 @@
           <a:lstStyle/>
           <a:p>
             <a:r>
-              <a:t>Psychologyp Educational psychology is the study of how humans learn in educational settings, the effectiveness of educational interventions, the psychology of teaching, and the social psychology of schools as organizations.</a:t>
+              <a:t>Transportation[edit]p There are many different forms of sailing ships, but they all have certain basic things in common.</a:t>
             </a:r>
           </a:p>
         </p:txBody>
@@ -4663,7 +4683,7 @@
           <a:lstStyle/>
           <a:p>
             <a:r>
-              <a:t>Psychological relationship</a:t>
+              <a:t>Power source[edit]</a:t>
             </a:r>
           </a:p>
         </p:txBody>
@@ -4684,7 +4704,7 @@
           <a:lstStyle/>
           <a:p>
             <a:r>
-              <a:t>Psychological relationshipp Intelligence is an important factor in how the individual responds to education.</a:t>
+              <a:t>Power source[edit]p Historically, the ancient Sinhalese of Anuradhapura and in other cities around Sri Lanka used the monsoon winds to power furnaces as early as 300 BCE.</a:t>
             </a:r>
           </a:p>
         </p:txBody>
@@ -4723,7 +4743,7 @@
           <a:lstStyle/>
           <a:p>
             <a:r>
-              <a:t>Learning modalities</a:t>
+              <a:t>Recreation[edit]</a:t>
             </a:r>
           </a:p>
         </p:txBody>
@@ -4744,7 +4764,7 @@
           <a:lstStyle/>
           <a:p>
             <a:r>
-              <a:t>Learning modalitiesp There has been much interest in learning modalities and styles over the last two decades.</a:t>
+              <a:t>Recreation[edit]p Wind figures prominently in several popular sports, including recreational hang gliding, hot air ballooning, kite flying, snowkiting, kite landboarding, kite surfing, paragliding, sailing, and windsurfing.</a:t>
             </a:r>
           </a:p>
         </p:txBody>
@@ -4783,7 +4803,7 @@
           <a:lstStyle/>
           <a:p>
             <a:r>
-              <a:t>Mind, brain, and education</a:t>
+              <a:t>Role in the natural world[edit]</a:t>
             </a:r>
           </a:p>
         </p:txBody>
@@ -4804,7 +4824,7 @@
           <a:lstStyle/>
           <a:p>
             <a:r>
-              <a:t>Mind, brain, and educationp Educational neuroscience is an emerging scientific field that brings together researchers in cognitive neuroscience, developmental cognitive neuroscience, educational psychology, educational technology, education theory and other related disciplines to explore the interactions between biological processes and education.</a:t>
+              <a:t>Role in the natural world[edit]p In arid climates, the main source of erosion is wind.</a:t>
             </a:r>
           </a:p>
         </p:txBody>
@@ -4843,7 +4863,7 @@
           <a:lstStyle/>
           <a:p>
             <a:r>
-              <a:t>Philosophy</a:t>
+              <a:t>Erosion[edit]</a:t>
             </a:r>
           </a:p>
         </p:txBody>
@@ -4864,7 +4884,7 @@
           <a:lstStyle/>
           <a:p>
             <a:r>
-              <a:t>Philosophyp As an academic field, philosophy of education is "the philosophical study of education and its problems its central subject matter is education, and its methods are those of philosophy".</a:t>
+              <a:t>Erosion[edit]p Erosion can be the result of material movement by the wind.</a:t>
             </a:r>
           </a:p>
         </p:txBody>
@@ -4903,7 +4923,7 @@
           <a:lstStyle/>
           <a:p>
             <a:r>
-              <a:t>Purpose</a:t>
+              <a:t>Desert dust migration[edit]</a:t>
             </a:r>
           </a:p>
         </p:txBody>
@@ -4924,7 +4944,7 @@
           <a:lstStyle/>
           <a:p>
             <a:r>
-              <a:t>Purposep There is no broad consensus as to what education's chief aim or aims are or should be.</a:t>
+              <a:t>Desert dust migration[edit]p During mid-summer (July in the northern hemisphere), the westward-moving trade winds south of the northward-moving subtropical ridge expand northwestward from the Caribbean into southeastern North America.</a:t>
             </a:r>
           </a:p>
         </p:txBody>
@@ -4963,7 +4983,7 @@
           <a:lstStyle/>
           <a:p>
             <a:r>
-              <a:t>Curriculum</a:t>
+              <a:t>Effect on plants[edit]</a:t>
             </a:r>
           </a:p>
         </p:txBody>
@@ -4984,7 +5004,7 @@
           <a:lstStyle/>
           <a:p>
             <a:r>
-              <a:t>Curriculump In formal education, a curriculum is the set of courses and their content offered at a school or university.</a:t>
+              <a:t>Effect on plants[edit]p Wind dispersal of seeds, or anemochory, is one of the more primitive means of dispersal.</a:t>
             </a:r>
           </a:p>
         </p:txBody>
@@ -5023,7 +5043,7 @@
           <a:lstStyle/>
           <a:p>
             <a:r>
-              <a:t>Instruction</a:t>
+              <a:t>Effect on animals[edit]</a:t>
             </a:r>
           </a:p>
         </p:txBody>
@@ -5044,7 +5064,7 @@
           <a:lstStyle/>
           <a:p>
             <a:r>
-              <a:t>Instructionp Instruction is the facilitation of another's learning.</a:t>
+              <a:t>Effect on animals[edit]p Cattle and sheep are prone to wind chill caused by a combination of wind and cold temperatures, when winds exceed 40 kilometers per hour (25 mph), rendering their hair and wool coverings ineffective.</a:t>
             </a:r>
           </a:p>
         </p:txBody>
@@ -5083,7 +5103,7 @@
           <a:lstStyle/>
           <a:p>
             <a:r>
-              <a:t>Economics</a:t>
+              <a:t>Sound generation[edit]</a:t>
             </a:r>
           </a:p>
         </p:txBody>
@@ -5104,7 +5124,7 @@
           <a:lstStyle/>
           <a:p>
             <a:r>
-              <a:t>Economicsp It has been argued that high rates of education are essential for countries to be able to achieve high levels of economic growth.</a:t>
+              <a:t>Sound generation[edit]p Wind causes the generation of sound.</a:t>
             </a:r>
           </a:p>
         </p:txBody>
@@ -5143,7 +5163,7 @@
           <a:lstStyle/>
           <a:p>
             <a:r>
-              <a:t>Future</a:t>
+              <a:t>Related damage[edit]</a:t>
             </a:r>
           </a:p>
         </p:txBody>
@@ -5164,7 +5184,7 @@
           <a:lstStyle/>
           <a:p>
             <a:r>
-              <a:t>Futurep The world is changing at an ever quickening rate, which means that a lot of knowledge becomes obsolete and inaccurate more quickly.</a:t>
+              <a:t>Related damage[edit]p High winds are known to cause damage, depending upon the magnitude of their velocity and pressure differential.</a:t>
             </a:r>
           </a:p>
         </p:txBody>
@@ -5224,44 +5244,620 @@
           <a:lstStyle/>
           <a:p>
             <a:r>
-              <a:t>  -- Special</a:t>
-            </a:r>
-          </a:p>
-          <a:p>
-            <a:r>
-              <a:t> Other forms</a:t>
-            </a:r>
-          </a:p>
-          <a:p>
-            <a:r>
-              <a:t>  -- Alternative</a:t>
-            </a:r>
-          </a:p>
-          <a:p>
-            <a:r>
-              <a:t>  -- Indigenous</a:t>
-            </a:r>
-          </a:p>
-          <a:p>
-            <a:r>
-              <a:t>  -- Informal learning</a:t>
-            </a:r>
-          </a:p>
-          <a:p>
-            <a:r>
-              <a:t>  -- Self-directed learning</a:t>
-            </a:r>
-          </a:p>
-          <a:p>
-            <a:r>
-              <a:t>  -- Evidence-based</a:t>
-            </a:r>
-          </a:p>
-          <a:p>
-            <a:r>
-              <a:t>  -- Open learning and electronic technology</a:t>
-            </a:r>
-          </a:p>
+              <a:t> Global climatology[edit]</a:t>
+            </a:r>
+          </a:p>
+          <a:p>
+            <a:r>
+              <a:t>  -- Tropics[edit]</a:t>
+            </a:r>
+          </a:p>
+          <a:p>
+            <a:r>
+              <a:t>  -- Westerlies and their impact[edit]</a:t>
+            </a:r>
+          </a:p>
+          <a:p>
+            <a:r>
+              <a:t>  -- Polar easterlies[edit]</a:t>
+            </a:r>
+          </a:p>
+          <a:p>
+            <a:r>
+              <a:t> Local considerations[edit]</a:t>
+            </a:r>
+          </a:p>
+          <a:p>
+            <a:r>
+              <a:t>  -- Sea and land breezes[edit]</a:t>
+            </a:r>
+          </a:p>
+          <a:p>
+            <a:r>
+              <a:t>  -- Near mountains[edit]</a:t>
+            </a:r>
+          </a:p>
+          <a:p>
+            <a:r>
+              <a:t> Average wind speeds[edit]</a:t>
+            </a:r>
+          </a:p>
+          <a:p/>
+        </p:txBody>
+      </p:sp>
+    </p:spTree>
+  </p:cSld>
+  <p:clrMapOvr>
+    <a:masterClrMapping/>
+  </p:clrMapOvr>
+</p:sld>
+</file>
+
+<file path=ppt/slides/slide40.xml><?xml version="1.0" encoding="utf-8"?>
+<p:sld xmlns:a="http://schemas.openxmlformats.org/drawingml/2006/main" xmlns:p="http://schemas.openxmlformats.org/presentationml/2006/main" xmlns:r="http://schemas.openxmlformats.org/officeDocument/2006/relationships">
+  <p:cSld>
+    <p:spTree>
+      <p:nvGrpSpPr>
+        <p:cNvPr id="1" name=""/>
+        <p:cNvGrpSpPr/>
+        <p:nvPr/>
+      </p:nvGrpSpPr>
+      <p:grpSpPr/>
+      <p:sp>
+        <p:nvSpPr>
+          <p:cNvPr id="2" name="Title 1"/>
+          <p:cNvSpPr>
+            <a:spLocks noGrp="1"/>
+          </p:cNvSpPr>
+          <p:nvPr>
+            <p:ph type="title"/>
+          </p:nvPr>
+        </p:nvSpPr>
+        <p:spPr/>
+        <p:txBody>
+          <a:bodyPr/>
+          <a:lstStyle/>
+          <a:p>
+            <a:r>
+              <a:t>In outer space[edit]</a:t>
+            </a:r>
+          </a:p>
+        </p:txBody>
+      </p:sp>
+      <p:sp>
+        <p:nvSpPr>
+          <p:cNvPr id="3" name="Content Placeholder 2"/>
+          <p:cNvSpPr>
+            <a:spLocks noGrp="1"/>
+          </p:cNvSpPr>
+          <p:nvPr>
+            <p:ph idx="1"/>
+          </p:nvPr>
+        </p:nvSpPr>
+        <p:spPr/>
+        <p:txBody>
+          <a:bodyPr/>
+          <a:lstStyle/>
+          <a:p>
+            <a:r>
+              <a:t>In outer space[edit]p The solar wind is quite different from a terrestrial wind, in that its origin is the sun, and it is composed of charged particles that have escaped the sun's atmosphere.</a:t>
+            </a:r>
+          </a:p>
+        </p:txBody>
+      </p:sp>
+    </p:spTree>
+  </p:cSld>
+  <p:clrMapOvr>
+    <a:masterClrMapping/>
+  </p:clrMapOvr>
+</p:sld>
+</file>
+
+<file path=ppt/slides/slide41.xml><?xml version="1.0" encoding="utf-8"?>
+<p:sld xmlns:a="http://schemas.openxmlformats.org/drawingml/2006/main" xmlns:p="http://schemas.openxmlformats.org/presentationml/2006/main" xmlns:r="http://schemas.openxmlformats.org/officeDocument/2006/relationships">
+  <p:cSld>
+    <p:spTree>
+      <p:nvGrpSpPr>
+        <p:cNvPr id="1" name=""/>
+        <p:cNvGrpSpPr/>
+        <p:nvPr/>
+      </p:nvGrpSpPr>
+      <p:grpSpPr/>
+      <p:sp>
+        <p:nvSpPr>
+          <p:cNvPr id="2" name="Title 1"/>
+          <p:cNvSpPr>
+            <a:spLocks noGrp="1"/>
+          </p:cNvSpPr>
+          <p:nvPr>
+            <p:ph type="title"/>
+          </p:nvPr>
+        </p:nvSpPr>
+        <p:spPr/>
+        <p:txBody>
+          <a:bodyPr/>
+          <a:lstStyle/>
+          <a:p>
+            <a:r>
+              <a:t>Planetary wind[edit]</a:t>
+            </a:r>
+          </a:p>
+        </p:txBody>
+      </p:sp>
+      <p:sp>
+        <p:nvSpPr>
+          <p:cNvPr id="3" name="Content Placeholder 2"/>
+          <p:cNvSpPr>
+            <a:spLocks noGrp="1"/>
+          </p:cNvSpPr>
+          <p:nvPr>
+            <p:ph idx="1"/>
+          </p:nvPr>
+        </p:nvSpPr>
+        <p:spPr/>
+        <p:txBody>
+          <a:bodyPr/>
+          <a:lstStyle/>
+          <a:p>
+            <a:r>
+              <a:t>Planetary wind[edit]p The hydrodynamic wind within the upper portion of a planet's atmosphere allows light chemical elements such as hydrogen to move up to the exobase, the lower limit of the exosphere, where the gases can then reach escape velocity, entering outer space without impacting other particles of gas.</a:t>
+            </a:r>
+          </a:p>
+        </p:txBody>
+      </p:sp>
+    </p:spTree>
+  </p:cSld>
+  <p:clrMapOvr>
+    <a:masterClrMapping/>
+  </p:clrMapOvr>
+</p:sld>
+</file>
+
+<file path=ppt/slides/slide42.xml><?xml version="1.0" encoding="utf-8"?>
+<p:sld xmlns:a="http://schemas.openxmlformats.org/drawingml/2006/main" xmlns:p="http://schemas.openxmlformats.org/presentationml/2006/main" xmlns:r="http://schemas.openxmlformats.org/officeDocument/2006/relationships">
+  <p:cSld>
+    <p:spTree>
+      <p:nvGrpSpPr>
+        <p:cNvPr id="1" name=""/>
+        <p:cNvGrpSpPr/>
+        <p:nvPr/>
+      </p:nvGrpSpPr>
+      <p:grpSpPr/>
+      <p:sp>
+        <p:nvSpPr>
+          <p:cNvPr id="2" name="Title 1"/>
+          <p:cNvSpPr>
+            <a:spLocks noGrp="1"/>
+          </p:cNvSpPr>
+          <p:nvPr>
+            <p:ph type="title"/>
+          </p:nvPr>
+        </p:nvSpPr>
+        <p:spPr/>
+        <p:txBody>
+          <a:bodyPr/>
+          <a:lstStyle/>
+          <a:p>
+            <a:r>
+              <a:t>Solar wind[edit]</a:t>
+            </a:r>
+          </a:p>
+        </p:txBody>
+      </p:sp>
+      <p:sp>
+        <p:nvSpPr>
+          <p:cNvPr id="3" name="Content Placeholder 2"/>
+          <p:cNvSpPr>
+            <a:spLocks noGrp="1"/>
+          </p:cNvSpPr>
+          <p:nvPr>
+            <p:ph idx="1"/>
+          </p:nvPr>
+        </p:nvSpPr>
+        <p:spPr/>
+        <p:txBody>
+          <a:bodyPr/>
+          <a:lstStyle/>
+          <a:p>
+            <a:r>
+              <a:t>Solar wind[edit]p Rather than air, the solar wind is a stream of charged particles—a plasma—ejected from the upper atmosphere of the sun at a rate of 400 kilometers per second (890,000 mph).</a:t>
+            </a:r>
+          </a:p>
+        </p:txBody>
+      </p:sp>
+    </p:spTree>
+  </p:cSld>
+  <p:clrMapOvr>
+    <a:masterClrMapping/>
+  </p:clrMapOvr>
+</p:sld>
+</file>
+
+<file path=ppt/slides/slide43.xml><?xml version="1.0" encoding="utf-8"?>
+<p:sld xmlns:a="http://schemas.openxmlformats.org/drawingml/2006/main" xmlns:p="http://schemas.openxmlformats.org/presentationml/2006/main" xmlns:r="http://schemas.openxmlformats.org/officeDocument/2006/relationships">
+  <p:cSld>
+    <p:spTree>
+      <p:nvGrpSpPr>
+        <p:cNvPr id="1" name=""/>
+        <p:cNvGrpSpPr/>
+        <p:nvPr/>
+      </p:nvGrpSpPr>
+      <p:grpSpPr/>
+      <p:sp>
+        <p:nvSpPr>
+          <p:cNvPr id="2" name="Title 1"/>
+          <p:cNvSpPr>
+            <a:spLocks noGrp="1"/>
+          </p:cNvSpPr>
+          <p:nvPr>
+            <p:ph type="title"/>
+          </p:nvPr>
+        </p:nvSpPr>
+        <p:spPr/>
+        <p:txBody>
+          <a:bodyPr/>
+          <a:lstStyle/>
+          <a:p>
+            <a:r>
+              <a:t>On other planets[edit]</a:t>
+            </a:r>
+          </a:p>
+        </p:txBody>
+      </p:sp>
+      <p:sp>
+        <p:nvSpPr>
+          <p:cNvPr id="3" name="Content Placeholder 2"/>
+          <p:cNvSpPr>
+            <a:spLocks noGrp="1"/>
+          </p:cNvSpPr>
+          <p:nvPr>
+            <p:ph idx="1"/>
+          </p:nvPr>
+        </p:nvSpPr>
+        <p:spPr/>
+        <p:txBody>
+          <a:bodyPr/>
+          <a:lstStyle/>
+          <a:p>
+            <a:r>
+              <a:t>On other planets[edit]p Strong 300 kilometers per hour (190 mph) winds at Venus's cloud tops circle the planet every four to five earth days.</a:t>
+            </a:r>
+          </a:p>
+        </p:txBody>
+      </p:sp>
+    </p:spTree>
+  </p:cSld>
+  <p:clrMapOvr>
+    <a:masterClrMapping/>
+  </p:clrMapOvr>
+</p:sld>
+</file>
+
+<file path=ppt/slides/slide44.xml><?xml version="1.0" encoding="utf-8"?>
+<p:sld xmlns:a="http://schemas.openxmlformats.org/drawingml/2006/main" xmlns:p="http://schemas.openxmlformats.org/presentationml/2006/main" xmlns:r="http://schemas.openxmlformats.org/officeDocument/2006/relationships">
+  <p:cSld>
+    <p:spTree>
+      <p:nvGrpSpPr>
+        <p:cNvPr id="1" name=""/>
+        <p:cNvGrpSpPr/>
+        <p:nvPr/>
+      </p:nvGrpSpPr>
+      <p:grpSpPr/>
+      <p:sp>
+        <p:nvSpPr>
+          <p:cNvPr id="2" name="Title 1"/>
+          <p:cNvSpPr>
+            <a:spLocks noGrp="1"/>
+          </p:cNvSpPr>
+          <p:nvPr>
+            <p:ph type="title"/>
+          </p:nvPr>
+        </p:nvSpPr>
+        <p:spPr/>
+        <p:txBody>
+          <a:bodyPr/>
+          <a:lstStyle/>
+          <a:p>
+            <a:r>
+              <a:t>See also[edit]</a:t>
+            </a:r>
+          </a:p>
+        </p:txBody>
+      </p:sp>
+      <p:sp>
+        <p:nvSpPr>
+          <p:cNvPr id="3" name="Content Placeholder 2"/>
+          <p:cNvSpPr>
+            <a:spLocks noGrp="1"/>
+          </p:cNvSpPr>
+          <p:nvPr>
+            <p:ph idx="1"/>
+          </p:nvPr>
+        </p:nvSpPr>
+        <p:spPr/>
+        <p:txBody>
+          <a:bodyPr/>
+          <a:lstStyle/>
+          <a:p/>
+        </p:txBody>
+      </p:sp>
+    </p:spTree>
+  </p:cSld>
+  <p:clrMapOvr>
+    <a:masterClrMapping/>
+  </p:clrMapOvr>
+</p:sld>
+</file>
+
+<file path=ppt/slides/slide45.xml><?xml version="1.0" encoding="utf-8"?>
+<p:sld xmlns:a="http://schemas.openxmlformats.org/drawingml/2006/main" xmlns:p="http://schemas.openxmlformats.org/presentationml/2006/main" xmlns:r="http://schemas.openxmlformats.org/officeDocument/2006/relationships">
+  <p:cSld>
+    <p:spTree>
+      <p:nvGrpSpPr>
+        <p:cNvPr id="1" name=""/>
+        <p:cNvGrpSpPr/>
+        <p:nvPr/>
+      </p:nvGrpSpPr>
+      <p:grpSpPr/>
+      <p:sp>
+        <p:nvSpPr>
+          <p:cNvPr id="2" name="Title 1"/>
+          <p:cNvSpPr>
+            <a:spLocks noGrp="1"/>
+          </p:cNvSpPr>
+          <p:nvPr>
+            <p:ph type="title"/>
+          </p:nvPr>
+        </p:nvSpPr>
+        <p:spPr/>
+        <p:txBody>
+          <a:bodyPr/>
+          <a:lstStyle/>
+          <a:p>
+            <a:r>
+              <a:t>References[edit]</a:t>
+            </a:r>
+          </a:p>
+        </p:txBody>
+      </p:sp>
+      <p:sp>
+        <p:nvSpPr>
+          <p:cNvPr id="3" name="Content Placeholder 2"/>
+          <p:cNvSpPr>
+            <a:spLocks noGrp="1"/>
+          </p:cNvSpPr>
+          <p:nvPr>
+            <p:ph idx="1"/>
+          </p:nvPr>
+        </p:nvSpPr>
+        <p:spPr/>
+        <p:txBody>
+          <a:bodyPr/>
+          <a:lstStyle/>
+          <a:p/>
+        </p:txBody>
+      </p:sp>
+    </p:spTree>
+  </p:cSld>
+  <p:clrMapOvr>
+    <a:masterClrMapping/>
+  </p:clrMapOvr>
+</p:sld>
+</file>
+
+<file path=ppt/slides/slide46.xml><?xml version="1.0" encoding="utf-8"?>
+<p:sld xmlns:a="http://schemas.openxmlformats.org/drawingml/2006/main" xmlns:p="http://schemas.openxmlformats.org/presentationml/2006/main" xmlns:r="http://schemas.openxmlformats.org/officeDocument/2006/relationships">
+  <p:cSld>
+    <p:spTree>
+      <p:nvGrpSpPr>
+        <p:cNvPr id="1" name=""/>
+        <p:cNvGrpSpPr/>
+        <p:nvPr/>
+      </p:nvGrpSpPr>
+      <p:grpSpPr/>
+      <p:sp>
+        <p:nvSpPr>
+          <p:cNvPr id="2" name="Title 1"/>
+          <p:cNvSpPr>
+            <a:spLocks noGrp="1"/>
+          </p:cNvSpPr>
+          <p:nvPr>
+            <p:ph type="title"/>
+          </p:nvPr>
+        </p:nvSpPr>
+        <p:spPr/>
+        <p:txBody>
+          <a:bodyPr/>
+          <a:lstStyle/>
+          <a:p>
+            <a:r>
+              <a:t>External links[edit]</a:t>
+            </a:r>
+          </a:p>
+        </p:txBody>
+      </p:sp>
+      <p:sp>
+        <p:nvSpPr>
+          <p:cNvPr id="3" name="Content Placeholder 2"/>
+          <p:cNvSpPr>
+            <a:spLocks noGrp="1"/>
+          </p:cNvSpPr>
+          <p:nvPr>
+            <p:ph idx="1"/>
+          </p:nvPr>
+        </p:nvSpPr>
+        <p:spPr/>
+        <p:txBody>
+          <a:bodyPr/>
+          <a:lstStyle/>
+          <a:p/>
+        </p:txBody>
+      </p:sp>
+    </p:spTree>
+  </p:cSld>
+  <p:clrMapOvr>
+    <a:masterClrMapping/>
+  </p:clrMapOvr>
+</p:sld>
+</file>
+
+<file path=ppt/slides/slide47.xml><?xml version="1.0" encoding="utf-8"?>
+<p:sld xmlns:a="http://schemas.openxmlformats.org/drawingml/2006/main" xmlns:p="http://schemas.openxmlformats.org/presentationml/2006/main" xmlns:r="http://schemas.openxmlformats.org/officeDocument/2006/relationships">
+  <p:cSld>
+    <p:spTree>
+      <p:nvGrpSpPr>
+        <p:cNvPr id="1" name=""/>
+        <p:cNvGrpSpPr/>
+        <p:nvPr/>
+      </p:nvGrpSpPr>
+      <p:grpSpPr/>
+      <p:sp>
+        <p:nvSpPr>
+          <p:cNvPr id="2" name="Title 1"/>
+          <p:cNvSpPr>
+            <a:spLocks noGrp="1"/>
+          </p:cNvSpPr>
+          <p:nvPr>
+            <p:ph type="title"/>
+          </p:nvPr>
+        </p:nvSpPr>
+        <p:spPr/>
+        <p:txBody>
+          <a:bodyPr/>
+          <a:lstStyle/>
+          <a:p>
+            <a:r>
+              <a:t>Navigation menu</a:t>
+            </a:r>
+          </a:p>
+        </p:txBody>
+      </p:sp>
+      <p:sp>
+        <p:nvSpPr>
+          <p:cNvPr id="3" name="Content Placeholder 2"/>
+          <p:cNvSpPr>
+            <a:spLocks noGrp="1"/>
+          </p:cNvSpPr>
+          <p:nvPr>
+            <p:ph idx="1"/>
+          </p:nvPr>
+        </p:nvSpPr>
+        <p:spPr/>
+        <p:txBody>
+          <a:bodyPr/>
+          <a:lstStyle/>
+          <a:p/>
+        </p:txBody>
+      </p:sp>
+    </p:spTree>
+  </p:cSld>
+  <p:clrMapOvr>
+    <a:masterClrMapping/>
+  </p:clrMapOvr>
+</p:sld>
+</file>
+
+<file path=ppt/slides/slide48.xml><?xml version="1.0" encoding="utf-8"?>
+<p:sld xmlns:a="http://schemas.openxmlformats.org/drawingml/2006/main" xmlns:p="http://schemas.openxmlformats.org/presentationml/2006/main" xmlns:r="http://schemas.openxmlformats.org/officeDocument/2006/relationships">
+  <p:cSld>
+    <p:spTree>
+      <p:nvGrpSpPr>
+        <p:cNvPr id="1" name=""/>
+        <p:cNvGrpSpPr/>
+        <p:nvPr/>
+      </p:nvGrpSpPr>
+      <p:grpSpPr/>
+      <p:sp>
+        <p:nvSpPr>
+          <p:cNvPr id="2" name="Title 1"/>
+          <p:cNvSpPr>
+            <a:spLocks noGrp="1"/>
+          </p:cNvSpPr>
+          <p:nvPr>
+            <p:ph type="title"/>
+          </p:nvPr>
+        </p:nvSpPr>
+        <p:spPr/>
+        <p:txBody>
+          <a:bodyPr/>
+          <a:lstStyle/>
+          <a:p>
+            <a:r>
+              <a:t>Personal tools</a:t>
+            </a:r>
+          </a:p>
+        </p:txBody>
+      </p:sp>
+      <p:sp>
+        <p:nvSpPr>
+          <p:cNvPr id="3" name="Content Placeholder 2"/>
+          <p:cNvSpPr>
+            <a:spLocks noGrp="1"/>
+          </p:cNvSpPr>
+          <p:nvPr>
+            <p:ph idx="1"/>
+          </p:nvPr>
+        </p:nvSpPr>
+        <p:spPr/>
+        <p:txBody>
+          <a:bodyPr/>
+          <a:lstStyle/>
+          <a:p/>
+        </p:txBody>
+      </p:sp>
+    </p:spTree>
+  </p:cSld>
+  <p:clrMapOvr>
+    <a:masterClrMapping/>
+  </p:clrMapOvr>
+</p:sld>
+</file>
+
+<file path=ppt/slides/slide49.xml><?xml version="1.0" encoding="utf-8"?>
+<p:sld xmlns:a="http://schemas.openxmlformats.org/drawingml/2006/main" xmlns:p="http://schemas.openxmlformats.org/presentationml/2006/main" xmlns:r="http://schemas.openxmlformats.org/officeDocument/2006/relationships">
+  <p:cSld>
+    <p:spTree>
+      <p:nvGrpSpPr>
+        <p:cNvPr id="1" name=""/>
+        <p:cNvGrpSpPr/>
+        <p:nvPr/>
+      </p:nvGrpSpPr>
+      <p:grpSpPr/>
+      <p:sp>
+        <p:nvSpPr>
+          <p:cNvPr id="2" name="Title 1"/>
+          <p:cNvSpPr>
+            <a:spLocks noGrp="1"/>
+          </p:cNvSpPr>
+          <p:nvPr>
+            <p:ph type="title"/>
+          </p:nvPr>
+        </p:nvSpPr>
+        <p:spPr/>
+        <p:txBody>
+          <a:bodyPr/>
+          <a:lstStyle/>
+          <a:p>
+            <a:r>
+              <a:t>Namespaces</a:t>
+            </a:r>
+          </a:p>
+        </p:txBody>
+      </p:sp>
+      <p:sp>
+        <p:nvSpPr>
+          <p:cNvPr id="3" name="Content Placeholder 2"/>
+          <p:cNvSpPr>
+            <a:spLocks noGrp="1"/>
+          </p:cNvSpPr>
+          <p:nvPr>
+            <p:ph idx="1"/>
+          </p:nvPr>
+        </p:nvSpPr>
+        <p:spPr/>
+        <p:txBody>
+          <a:bodyPr/>
+          <a:lstStyle/>
           <a:p/>
         </p:txBody>
       </p:sp>
@@ -5320,49 +5916,609 @@
           <a:lstStyle/>
           <a:p>
             <a:r>
-              <a:t> Development goals</a:t>
-            </a:r>
-          </a:p>
-          <a:p>
-            <a:r>
-              <a:t>  -- Internationalisation</a:t>
-            </a:r>
-          </a:p>
-          <a:p>
-            <a:r>
-              <a:t>  -- Technology in developing countries</a:t>
-            </a:r>
-          </a:p>
-          <a:p>
-            <a:r>
-              <a:t>  -- Funding in developing countries</a:t>
-            </a:r>
-          </a:p>
-          <a:p>
-            <a:r>
-              <a:t> Theory</a:t>
-            </a:r>
-          </a:p>
-          <a:p>
-            <a:r>
-              <a:t>  -- Psychology</a:t>
-            </a:r>
-          </a:p>
-          <a:p>
-            <a:r>
-              <a:t>  -- Psychological relationship</a:t>
-            </a:r>
-          </a:p>
-          <a:p>
-            <a:r>
-              <a:t>  -- Learning modalities</a:t>
-            </a:r>
-          </a:p>
-          <a:p>
-            <a:r>
-              <a:t>  -- Mind, brain, and education</a:t>
-            </a:r>
-          </a:p>
+              <a:t> Shear[edit]</a:t>
+            </a:r>
+          </a:p>
+          <a:p>
+            <a:r>
+              <a:t> Usage[edit]</a:t>
+            </a:r>
+          </a:p>
+          <a:p>
+            <a:r>
+              <a:t>  -- History[edit]</a:t>
+            </a:r>
+          </a:p>
+          <a:p>
+            <a:r>
+              <a:t>  -- Transportation[edit]</a:t>
+            </a:r>
+          </a:p>
+          <a:p>
+            <a:r>
+              <a:t>  -- Power source[edit]</a:t>
+            </a:r>
+          </a:p>
+          <a:p>
+            <a:r>
+              <a:t>  -- Recreation[edit]</a:t>
+            </a:r>
+          </a:p>
+          <a:p>
+            <a:r>
+              <a:t> Role in the natural world[edit]</a:t>
+            </a:r>
+          </a:p>
+          <a:p>
+            <a:r>
+              <a:t>  -- Erosion[edit]</a:t>
+            </a:r>
+          </a:p>
+          <a:p>
+            <a:r>
+              <a:t>  -- Desert dust migration[edit]</a:t>
+            </a:r>
+          </a:p>
+          <a:p/>
+        </p:txBody>
+      </p:sp>
+    </p:spTree>
+  </p:cSld>
+  <p:clrMapOvr>
+    <a:masterClrMapping/>
+  </p:clrMapOvr>
+</p:sld>
+</file>
+
+<file path=ppt/slides/slide50.xml><?xml version="1.0" encoding="utf-8"?>
+<p:sld xmlns:a="http://schemas.openxmlformats.org/drawingml/2006/main" xmlns:p="http://schemas.openxmlformats.org/presentationml/2006/main" xmlns:r="http://schemas.openxmlformats.org/officeDocument/2006/relationships">
+  <p:cSld>
+    <p:spTree>
+      <p:nvGrpSpPr>
+        <p:cNvPr id="1" name=""/>
+        <p:cNvGrpSpPr/>
+        <p:nvPr/>
+      </p:nvGrpSpPr>
+      <p:grpSpPr/>
+      <p:sp>
+        <p:nvSpPr>
+          <p:cNvPr id="2" name="Title 1"/>
+          <p:cNvSpPr>
+            <a:spLocks noGrp="1"/>
+          </p:cNvSpPr>
+          <p:nvPr>
+            <p:ph type="title"/>
+          </p:nvPr>
+        </p:nvSpPr>
+        <p:spPr/>
+        <p:txBody>
+          <a:bodyPr/>
+          <a:lstStyle/>
+          <a:p>
+            <a:r>
+              <a:t>Variants</a:t>
+            </a:r>
+          </a:p>
+        </p:txBody>
+      </p:sp>
+      <p:sp>
+        <p:nvSpPr>
+          <p:cNvPr id="3" name="Content Placeholder 2"/>
+          <p:cNvSpPr>
+            <a:spLocks noGrp="1"/>
+          </p:cNvSpPr>
+          <p:nvPr>
+            <p:ph idx="1"/>
+          </p:nvPr>
+        </p:nvSpPr>
+        <p:spPr/>
+        <p:txBody>
+          <a:bodyPr/>
+          <a:lstStyle/>
+          <a:p/>
+        </p:txBody>
+      </p:sp>
+    </p:spTree>
+  </p:cSld>
+  <p:clrMapOvr>
+    <a:masterClrMapping/>
+  </p:clrMapOvr>
+</p:sld>
+</file>
+
+<file path=ppt/slides/slide51.xml><?xml version="1.0" encoding="utf-8"?>
+<p:sld xmlns:a="http://schemas.openxmlformats.org/drawingml/2006/main" xmlns:p="http://schemas.openxmlformats.org/presentationml/2006/main" xmlns:r="http://schemas.openxmlformats.org/officeDocument/2006/relationships">
+  <p:cSld>
+    <p:spTree>
+      <p:nvGrpSpPr>
+        <p:cNvPr id="1" name=""/>
+        <p:cNvGrpSpPr/>
+        <p:nvPr/>
+      </p:nvGrpSpPr>
+      <p:grpSpPr/>
+      <p:sp>
+        <p:nvSpPr>
+          <p:cNvPr id="2" name="Title 1"/>
+          <p:cNvSpPr>
+            <a:spLocks noGrp="1"/>
+          </p:cNvSpPr>
+          <p:nvPr>
+            <p:ph type="title"/>
+          </p:nvPr>
+        </p:nvSpPr>
+        <p:spPr/>
+        <p:txBody>
+          <a:bodyPr/>
+          <a:lstStyle/>
+          <a:p>
+            <a:r>
+              <a:t>Views</a:t>
+            </a:r>
+          </a:p>
+        </p:txBody>
+      </p:sp>
+      <p:sp>
+        <p:nvSpPr>
+          <p:cNvPr id="3" name="Content Placeholder 2"/>
+          <p:cNvSpPr>
+            <a:spLocks noGrp="1"/>
+          </p:cNvSpPr>
+          <p:nvPr>
+            <p:ph idx="1"/>
+          </p:nvPr>
+        </p:nvSpPr>
+        <p:spPr/>
+        <p:txBody>
+          <a:bodyPr/>
+          <a:lstStyle/>
+          <a:p/>
+        </p:txBody>
+      </p:sp>
+    </p:spTree>
+  </p:cSld>
+  <p:clrMapOvr>
+    <a:masterClrMapping/>
+  </p:clrMapOvr>
+</p:sld>
+</file>
+
+<file path=ppt/slides/slide52.xml><?xml version="1.0" encoding="utf-8"?>
+<p:sld xmlns:a="http://schemas.openxmlformats.org/drawingml/2006/main" xmlns:p="http://schemas.openxmlformats.org/presentationml/2006/main" xmlns:r="http://schemas.openxmlformats.org/officeDocument/2006/relationships">
+  <p:cSld>
+    <p:spTree>
+      <p:nvGrpSpPr>
+        <p:cNvPr id="1" name=""/>
+        <p:cNvGrpSpPr/>
+        <p:nvPr/>
+      </p:nvGrpSpPr>
+      <p:grpSpPr/>
+      <p:sp>
+        <p:nvSpPr>
+          <p:cNvPr id="2" name="Title 1"/>
+          <p:cNvSpPr>
+            <a:spLocks noGrp="1"/>
+          </p:cNvSpPr>
+          <p:nvPr>
+            <p:ph type="title"/>
+          </p:nvPr>
+        </p:nvSpPr>
+        <p:spPr/>
+        <p:txBody>
+          <a:bodyPr/>
+          <a:lstStyle/>
+          <a:p>
+            <a:r>
+              <a:t>More</a:t>
+            </a:r>
+          </a:p>
+        </p:txBody>
+      </p:sp>
+      <p:sp>
+        <p:nvSpPr>
+          <p:cNvPr id="3" name="Content Placeholder 2"/>
+          <p:cNvSpPr>
+            <a:spLocks noGrp="1"/>
+          </p:cNvSpPr>
+          <p:nvPr>
+            <p:ph idx="1"/>
+          </p:nvPr>
+        </p:nvSpPr>
+        <p:spPr/>
+        <p:txBody>
+          <a:bodyPr/>
+          <a:lstStyle/>
+          <a:p/>
+        </p:txBody>
+      </p:sp>
+    </p:spTree>
+  </p:cSld>
+  <p:clrMapOvr>
+    <a:masterClrMapping/>
+  </p:clrMapOvr>
+</p:sld>
+</file>
+
+<file path=ppt/slides/slide53.xml><?xml version="1.0" encoding="utf-8"?>
+<p:sld xmlns:a="http://schemas.openxmlformats.org/drawingml/2006/main" xmlns:p="http://schemas.openxmlformats.org/presentationml/2006/main" xmlns:r="http://schemas.openxmlformats.org/officeDocument/2006/relationships">
+  <p:cSld>
+    <p:spTree>
+      <p:nvGrpSpPr>
+        <p:cNvPr id="1" name=""/>
+        <p:cNvGrpSpPr/>
+        <p:nvPr/>
+      </p:nvGrpSpPr>
+      <p:grpSpPr/>
+      <p:sp>
+        <p:nvSpPr>
+          <p:cNvPr id="2" name="Title 1"/>
+          <p:cNvSpPr>
+            <a:spLocks noGrp="1"/>
+          </p:cNvSpPr>
+          <p:nvPr>
+            <p:ph type="title"/>
+          </p:nvPr>
+        </p:nvSpPr>
+        <p:spPr/>
+        <p:txBody>
+          <a:bodyPr/>
+          <a:lstStyle/>
+          <a:p>
+            <a:r>
+              <a:t>Search</a:t>
+            </a:r>
+          </a:p>
+        </p:txBody>
+      </p:sp>
+      <p:sp>
+        <p:nvSpPr>
+          <p:cNvPr id="3" name="Content Placeholder 2"/>
+          <p:cNvSpPr>
+            <a:spLocks noGrp="1"/>
+          </p:cNvSpPr>
+          <p:nvPr>
+            <p:ph idx="1"/>
+          </p:nvPr>
+        </p:nvSpPr>
+        <p:spPr/>
+        <p:txBody>
+          <a:bodyPr/>
+          <a:lstStyle/>
+          <a:p/>
+        </p:txBody>
+      </p:sp>
+    </p:spTree>
+  </p:cSld>
+  <p:clrMapOvr>
+    <a:masterClrMapping/>
+  </p:clrMapOvr>
+</p:sld>
+</file>
+
+<file path=ppt/slides/slide54.xml><?xml version="1.0" encoding="utf-8"?>
+<p:sld xmlns:a="http://schemas.openxmlformats.org/drawingml/2006/main" xmlns:p="http://schemas.openxmlformats.org/presentationml/2006/main" xmlns:r="http://schemas.openxmlformats.org/officeDocument/2006/relationships">
+  <p:cSld>
+    <p:spTree>
+      <p:nvGrpSpPr>
+        <p:cNvPr id="1" name=""/>
+        <p:cNvGrpSpPr/>
+        <p:nvPr/>
+      </p:nvGrpSpPr>
+      <p:grpSpPr/>
+      <p:sp>
+        <p:nvSpPr>
+          <p:cNvPr id="2" name="Title 1"/>
+          <p:cNvSpPr>
+            <a:spLocks noGrp="1"/>
+          </p:cNvSpPr>
+          <p:nvPr>
+            <p:ph type="title"/>
+          </p:nvPr>
+        </p:nvSpPr>
+        <p:spPr/>
+        <p:txBody>
+          <a:bodyPr/>
+          <a:lstStyle/>
+          <a:p>
+            <a:r>
+              <a:t>Navigation</a:t>
+            </a:r>
+          </a:p>
+        </p:txBody>
+      </p:sp>
+      <p:sp>
+        <p:nvSpPr>
+          <p:cNvPr id="3" name="Content Placeholder 2"/>
+          <p:cNvSpPr>
+            <a:spLocks noGrp="1"/>
+          </p:cNvSpPr>
+          <p:nvPr>
+            <p:ph idx="1"/>
+          </p:nvPr>
+        </p:nvSpPr>
+        <p:spPr/>
+        <p:txBody>
+          <a:bodyPr/>
+          <a:lstStyle/>
+          <a:p/>
+        </p:txBody>
+      </p:sp>
+    </p:spTree>
+  </p:cSld>
+  <p:clrMapOvr>
+    <a:masterClrMapping/>
+  </p:clrMapOvr>
+</p:sld>
+</file>
+
+<file path=ppt/slides/slide55.xml><?xml version="1.0" encoding="utf-8"?>
+<p:sld xmlns:a="http://schemas.openxmlformats.org/drawingml/2006/main" xmlns:p="http://schemas.openxmlformats.org/presentationml/2006/main" xmlns:r="http://schemas.openxmlformats.org/officeDocument/2006/relationships">
+  <p:cSld>
+    <p:spTree>
+      <p:nvGrpSpPr>
+        <p:cNvPr id="1" name=""/>
+        <p:cNvGrpSpPr/>
+        <p:nvPr/>
+      </p:nvGrpSpPr>
+      <p:grpSpPr/>
+      <p:sp>
+        <p:nvSpPr>
+          <p:cNvPr id="2" name="Title 1"/>
+          <p:cNvSpPr>
+            <a:spLocks noGrp="1"/>
+          </p:cNvSpPr>
+          <p:nvPr>
+            <p:ph type="title"/>
+          </p:nvPr>
+        </p:nvSpPr>
+        <p:spPr/>
+        <p:txBody>
+          <a:bodyPr/>
+          <a:lstStyle/>
+          <a:p>
+            <a:r>
+              <a:t>Contribute</a:t>
+            </a:r>
+          </a:p>
+        </p:txBody>
+      </p:sp>
+      <p:sp>
+        <p:nvSpPr>
+          <p:cNvPr id="3" name="Content Placeholder 2"/>
+          <p:cNvSpPr>
+            <a:spLocks noGrp="1"/>
+          </p:cNvSpPr>
+          <p:nvPr>
+            <p:ph idx="1"/>
+          </p:nvPr>
+        </p:nvSpPr>
+        <p:spPr/>
+        <p:txBody>
+          <a:bodyPr/>
+          <a:lstStyle/>
+          <a:p/>
+        </p:txBody>
+      </p:sp>
+    </p:spTree>
+  </p:cSld>
+  <p:clrMapOvr>
+    <a:masterClrMapping/>
+  </p:clrMapOvr>
+</p:sld>
+</file>
+
+<file path=ppt/slides/slide56.xml><?xml version="1.0" encoding="utf-8"?>
+<p:sld xmlns:a="http://schemas.openxmlformats.org/drawingml/2006/main" xmlns:p="http://schemas.openxmlformats.org/presentationml/2006/main" xmlns:r="http://schemas.openxmlformats.org/officeDocument/2006/relationships">
+  <p:cSld>
+    <p:spTree>
+      <p:nvGrpSpPr>
+        <p:cNvPr id="1" name=""/>
+        <p:cNvGrpSpPr/>
+        <p:nvPr/>
+      </p:nvGrpSpPr>
+      <p:grpSpPr/>
+      <p:sp>
+        <p:nvSpPr>
+          <p:cNvPr id="2" name="Title 1"/>
+          <p:cNvSpPr>
+            <a:spLocks noGrp="1"/>
+          </p:cNvSpPr>
+          <p:nvPr>
+            <p:ph type="title"/>
+          </p:nvPr>
+        </p:nvSpPr>
+        <p:spPr/>
+        <p:txBody>
+          <a:bodyPr/>
+          <a:lstStyle/>
+          <a:p>
+            <a:r>
+              <a:t>Tools</a:t>
+            </a:r>
+          </a:p>
+        </p:txBody>
+      </p:sp>
+      <p:sp>
+        <p:nvSpPr>
+          <p:cNvPr id="3" name="Content Placeholder 2"/>
+          <p:cNvSpPr>
+            <a:spLocks noGrp="1"/>
+          </p:cNvSpPr>
+          <p:nvPr>
+            <p:ph idx="1"/>
+          </p:nvPr>
+        </p:nvSpPr>
+        <p:spPr/>
+        <p:txBody>
+          <a:bodyPr/>
+          <a:lstStyle/>
+          <a:p/>
+        </p:txBody>
+      </p:sp>
+    </p:spTree>
+  </p:cSld>
+  <p:clrMapOvr>
+    <a:masterClrMapping/>
+  </p:clrMapOvr>
+</p:sld>
+</file>
+
+<file path=ppt/slides/slide57.xml><?xml version="1.0" encoding="utf-8"?>
+<p:sld xmlns:a="http://schemas.openxmlformats.org/drawingml/2006/main" xmlns:p="http://schemas.openxmlformats.org/presentationml/2006/main" xmlns:r="http://schemas.openxmlformats.org/officeDocument/2006/relationships">
+  <p:cSld>
+    <p:spTree>
+      <p:nvGrpSpPr>
+        <p:cNvPr id="1" name=""/>
+        <p:cNvGrpSpPr/>
+        <p:nvPr/>
+      </p:nvGrpSpPr>
+      <p:grpSpPr/>
+      <p:sp>
+        <p:nvSpPr>
+          <p:cNvPr id="2" name="Title 1"/>
+          <p:cNvSpPr>
+            <a:spLocks noGrp="1"/>
+          </p:cNvSpPr>
+          <p:nvPr>
+            <p:ph type="title"/>
+          </p:nvPr>
+        </p:nvSpPr>
+        <p:spPr/>
+        <p:txBody>
+          <a:bodyPr/>
+          <a:lstStyle/>
+          <a:p>
+            <a:r>
+              <a:t>Print/export</a:t>
+            </a:r>
+          </a:p>
+        </p:txBody>
+      </p:sp>
+      <p:sp>
+        <p:nvSpPr>
+          <p:cNvPr id="3" name="Content Placeholder 2"/>
+          <p:cNvSpPr>
+            <a:spLocks noGrp="1"/>
+          </p:cNvSpPr>
+          <p:nvPr>
+            <p:ph idx="1"/>
+          </p:nvPr>
+        </p:nvSpPr>
+        <p:spPr/>
+        <p:txBody>
+          <a:bodyPr/>
+          <a:lstStyle/>
+          <a:p/>
+        </p:txBody>
+      </p:sp>
+    </p:spTree>
+  </p:cSld>
+  <p:clrMapOvr>
+    <a:masterClrMapping/>
+  </p:clrMapOvr>
+</p:sld>
+</file>
+
+<file path=ppt/slides/slide58.xml><?xml version="1.0" encoding="utf-8"?>
+<p:sld xmlns:a="http://schemas.openxmlformats.org/drawingml/2006/main" xmlns:p="http://schemas.openxmlformats.org/presentationml/2006/main" xmlns:r="http://schemas.openxmlformats.org/officeDocument/2006/relationships">
+  <p:cSld>
+    <p:spTree>
+      <p:nvGrpSpPr>
+        <p:cNvPr id="1" name=""/>
+        <p:cNvGrpSpPr/>
+        <p:nvPr/>
+      </p:nvGrpSpPr>
+      <p:grpSpPr/>
+      <p:sp>
+        <p:nvSpPr>
+          <p:cNvPr id="2" name="Title 1"/>
+          <p:cNvSpPr>
+            <a:spLocks noGrp="1"/>
+          </p:cNvSpPr>
+          <p:nvPr>
+            <p:ph type="title"/>
+          </p:nvPr>
+        </p:nvSpPr>
+        <p:spPr/>
+        <p:txBody>
+          <a:bodyPr/>
+          <a:lstStyle/>
+          <a:p>
+            <a:r>
+              <a:t>In other projects</a:t>
+            </a:r>
+          </a:p>
+        </p:txBody>
+      </p:sp>
+      <p:sp>
+        <p:nvSpPr>
+          <p:cNvPr id="3" name="Content Placeholder 2"/>
+          <p:cNvSpPr>
+            <a:spLocks noGrp="1"/>
+          </p:cNvSpPr>
+          <p:nvPr>
+            <p:ph idx="1"/>
+          </p:nvPr>
+        </p:nvSpPr>
+        <p:spPr/>
+        <p:txBody>
+          <a:bodyPr/>
+          <a:lstStyle/>
+          <a:p/>
+        </p:txBody>
+      </p:sp>
+    </p:spTree>
+  </p:cSld>
+  <p:clrMapOvr>
+    <a:masterClrMapping/>
+  </p:clrMapOvr>
+</p:sld>
+</file>
+
+<file path=ppt/slides/slide59.xml><?xml version="1.0" encoding="utf-8"?>
+<p:sld xmlns:a="http://schemas.openxmlformats.org/drawingml/2006/main" xmlns:p="http://schemas.openxmlformats.org/presentationml/2006/main" xmlns:r="http://schemas.openxmlformats.org/officeDocument/2006/relationships">
+  <p:cSld>
+    <p:spTree>
+      <p:nvGrpSpPr>
+        <p:cNvPr id="1" name=""/>
+        <p:cNvGrpSpPr/>
+        <p:nvPr/>
+      </p:nvGrpSpPr>
+      <p:grpSpPr/>
+      <p:sp>
+        <p:nvSpPr>
+          <p:cNvPr id="2" name="Title 1"/>
+          <p:cNvSpPr>
+            <a:spLocks noGrp="1"/>
+          </p:cNvSpPr>
+          <p:nvPr>
+            <p:ph type="title"/>
+          </p:nvPr>
+        </p:nvSpPr>
+        <p:spPr/>
+        <p:txBody>
+          <a:bodyPr/>
+          <a:lstStyle/>
+          <a:p>
+            <a:r>
+              <a:t>Languages</a:t>
+            </a:r>
+          </a:p>
+        </p:txBody>
+      </p:sp>
+      <p:sp>
+        <p:nvSpPr>
+          <p:cNvPr id="3" name="Content Placeholder 2"/>
+          <p:cNvSpPr>
+            <a:spLocks noGrp="1"/>
+          </p:cNvSpPr>
+          <p:nvPr>
+            <p:ph idx="1"/>
+          </p:nvPr>
+        </p:nvSpPr>
+        <p:spPr/>
+        <p:txBody>
+          <a:bodyPr/>
+          <a:lstStyle/>
           <a:p/>
         </p:txBody>
       </p:sp>
@@ -5421,32 +6577,47 @@
           <a:lstStyle/>
           <a:p>
             <a:r>
-              <a:t>  -- Philosophy</a:t>
-            </a:r>
-          </a:p>
-          <a:p>
-            <a:r>
-              <a:t>  -- Purpose</a:t>
-            </a:r>
-          </a:p>
-          <a:p>
-            <a:r>
-              <a:t>  -- Curriculum</a:t>
-            </a:r>
-          </a:p>
-          <a:p>
-            <a:r>
-              <a:t>  -- Instruction</a:t>
-            </a:r>
-          </a:p>
-          <a:p>
-            <a:r>
-              <a:t> Economics</a:t>
-            </a:r>
-          </a:p>
-          <a:p>
-            <a:r>
-              <a:t> Future</a:t>
+              <a:t>  -- Effect on plants[edit]</a:t>
+            </a:r>
+          </a:p>
+          <a:p>
+            <a:r>
+              <a:t>  -- Effect on animals[edit]</a:t>
+            </a:r>
+          </a:p>
+          <a:p>
+            <a:r>
+              <a:t>  -- Sound generation[edit]</a:t>
+            </a:r>
+          </a:p>
+          <a:p>
+            <a:r>
+              <a:t> Related damage[edit]</a:t>
+            </a:r>
+          </a:p>
+          <a:p>
+            <a:r>
+              <a:t> In outer space[edit]</a:t>
+            </a:r>
+          </a:p>
+          <a:p>
+            <a:r>
+              <a:t>  -- Planetary wind[edit]</a:t>
+            </a:r>
+          </a:p>
+          <a:p>
+            <a:r>
+              <a:t>  -- Solar wind[edit]</a:t>
+            </a:r>
+          </a:p>
+          <a:p>
+            <a:r>
+              <a:t> On other planets[edit]</a:t>
+            </a:r>
+          </a:p>
+          <a:p>
+            <a:r>
+              <a:t> See also[edit]</a:t>
             </a:r>
           </a:p>
           <a:p/>
@@ -5486,7 +6657,7 @@
           <a:lstStyle/>
           <a:p>
             <a:r>
-              <a:t>Contents</a:t>
+              <a:t>contents</a:t>
             </a:r>
           </a:p>
         </p:txBody>
@@ -5507,9 +6678,50 @@
           <a:lstStyle/>
           <a:p>
             <a:r>
-              <a:t>Contentsh2 Etymologyp Etymologically, the word "education" is derived from the Latin word ēducātiō ("A breeding, a bringing up, a rearing") from ēducō ("I educate, I train") which is related to the homonym ēdūcō ("I lead forth, I take out; I raise up, I erect") from ē- ("from, out of") and dūcō ("I lead, I conduct").</a:t>
-            </a:r>
-          </a:p>
+              <a:t> References[edit]</a:t>
+            </a:r>
+          </a:p>
+          <a:p>
+            <a:r>
+              <a:t> External links[edit]</a:t>
+            </a:r>
+          </a:p>
+          <a:p>
+            <a:r>
+              <a:t> Navigation menu</a:t>
+            </a:r>
+          </a:p>
+          <a:p>
+            <a:r>
+              <a:t>  -- Personal tools</a:t>
+            </a:r>
+          </a:p>
+          <a:p>
+            <a:r>
+              <a:t>  -- Namespaces</a:t>
+            </a:r>
+          </a:p>
+          <a:p>
+            <a:r>
+              <a:t>  -- Variants</a:t>
+            </a:r>
+          </a:p>
+          <a:p>
+            <a:r>
+              <a:t>  -- Views</a:t>
+            </a:r>
+          </a:p>
+          <a:p>
+            <a:r>
+              <a:t>  -- More</a:t>
+            </a:r>
+          </a:p>
+          <a:p>
+            <a:r>
+              <a:t>  -- Search</a:t>
+            </a:r>
+          </a:p>
+          <a:p/>
         </p:txBody>
       </p:sp>
     </p:spTree>
@@ -5546,7 +6758,7 @@
           <a:lstStyle/>
           <a:p>
             <a:r>
-              <a:t>Etymology</a:t>
+              <a:t>contents</a:t>
             </a:r>
           </a:p>
         </p:txBody>
@@ -5567,9 +6779,35 @@
           <a:lstStyle/>
           <a:p>
             <a:r>
-              <a:t>Etymologyp Etymologically, the word "education" is derived from the Latin word ēducātiō ("A breeding, a bringing up, a rearing") from ēducō ("I educate, I train") which is related to the homonym ēdūcō ("I lead forth, I take out; I raise up, I erect") from ē- ("from, out of") and dūcō ("I lead, I conduct").</a:t>
-            </a:r>
-          </a:p>
+              <a:t>  -- Navigation</a:t>
+            </a:r>
+          </a:p>
+          <a:p>
+            <a:r>
+              <a:t>  -- Contribute</a:t>
+            </a:r>
+          </a:p>
+          <a:p>
+            <a:r>
+              <a:t>  -- Tools</a:t>
+            </a:r>
+          </a:p>
+          <a:p>
+            <a:r>
+              <a:t>  -- Print/export</a:t>
+            </a:r>
+          </a:p>
+          <a:p>
+            <a:r>
+              <a:t>  -- In other projects</a:t>
+            </a:r>
+          </a:p>
+          <a:p>
+            <a:r>
+              <a:t>  -- Languages</a:t>
+            </a:r>
+          </a:p>
+          <a:p/>
         </p:txBody>
       </p:sp>
     </p:spTree>
@@ -5606,7 +6844,7 @@
           <a:lstStyle/>
           <a:p>
             <a:r>
-              <a:t>History</a:t>
+              <a:t>Contents</a:t>
             </a:r>
           </a:p>
         </p:txBody>
@@ -5627,7 +6865,7 @@
           <a:lstStyle/>
           <a:p>
             <a:r>
-              <a:t>Historyp Education began in prehistory, as adults trained the young in the knowledge and skills deemed necessary in their society.</a:t>
+              <a:t>Contentsh2 Causes[edit]p The wind is caused by differences in atmospheric pressure.</a:t>
             </a:r>
           </a:p>
         </p:txBody>

</xml_diff>